<commit_message>
enlarged main content area
</commit_message>
<xml_diff>
--- a/Templates/Template.pptx
+++ b/Templates/Template.pptx
@@ -217,7 +217,7 @@
           <a:p>
             <a:fld id="{08DE3F06-2D38-4165-B2BE-62B94463C303}" type="datetimeFigureOut">
               <a:rPr lang="he-IL" smtClean="0"/>
-              <a:t>כ"א/תשרי/תשפ"א</a:t>
+              <a:t>כ"ג/תשרי/תשפ"א</a:t>
             </a:fld>
             <a:endParaRPr lang="he-IL"/>
           </a:p>
@@ -788,7 +788,7 @@
         <p:spPr>
           <a:xfrm>
             <a:off x="346073" y="1533837"/>
-            <a:ext cx="11485183" cy="4063939"/>
+            <a:ext cx="11485183" cy="4450246"/>
           </a:xfrm>
           <a:prstGeom prst="rect">
             <a:avLst/>
@@ -995,62 +995,6 @@
               <a:t>‹#›</a:t>
             </a:fld>
             <a:endParaRPr lang="he-IL" dirty="0"/>
-          </a:p>
-        </p:txBody>
-      </p:sp>
-      <p:sp>
-        <p:nvSpPr>
-          <p:cNvPr id="8" name="dcomm">
-            <a:extLst>
-              <a:ext uri="{FF2B5EF4-FFF2-40B4-BE49-F238E27FC236}">
-                <a16:creationId xmlns:a16="http://schemas.microsoft.com/office/drawing/2014/main" id="{68E8E6D7-3BEA-4DF8-931E-6DB9091088B0}"/>
-              </a:ext>
-            </a:extLst>
-          </p:cNvPr>
-          <p:cNvSpPr>
-            <a:spLocks noGrp="1"/>
-          </p:cNvSpPr>
-          <p:nvPr>
-            <p:ph type="body" sz="quarter" idx="16" hasCustomPrompt="1"/>
-          </p:nvPr>
-        </p:nvSpPr>
-        <p:spPr>
-          <a:xfrm>
-            <a:off x="346074" y="5653322"/>
-            <a:ext cx="11485182" cy="345763"/>
-          </a:xfrm>
-          <a:prstGeom prst="rect">
-            <a:avLst/>
-          </a:prstGeom>
-        </p:spPr>
-        <p:txBody>
-          <a:bodyPr>
-            <a:noAutofit/>
-          </a:bodyPr>
-          <a:lstStyle>
-            <a:lvl1pPr>
-              <a:defRPr lang="en-IL" sz="1800" b="0" baseline="0" dirty="0">
-                <a:solidFill>
-                  <a:srgbClr val="0066FF"/>
-                </a:solidFill>
-                <a:latin typeface="Calibri" panose="020F0502020204030204" pitchFamily="34" charset="0"/>
-                <a:ea typeface="+mj-ea"/>
-                <a:cs typeface="Fb Albatros" panose="02020503050405020304" pitchFamily="18" charset="-79"/>
-              </a:defRPr>
-            </a:lvl1pPr>
-          </a:lstStyle>
-          <a:p>
-            <a:pPr lvl="0">
-              <a:spcBef>
-                <a:spcPct val="0"/>
-              </a:spcBef>
-              <a:buNone/>
-            </a:pPr>
-            <a:r>
-              <a:rPr lang="he-IL" dirty="0"/>
-              <a:t>לחץ כדי להוסיף תוכן</a:t>
-            </a:r>
-            <a:endParaRPr lang="en-IL" dirty="0"/>
           </a:p>
         </p:txBody>
       </p:sp>
@@ -1496,62 +1440,6 @@
       </p:sp>
       <p:sp>
         <p:nvSpPr>
-          <p:cNvPr id="11" name="dcomm">
-            <a:extLst>
-              <a:ext uri="{FF2B5EF4-FFF2-40B4-BE49-F238E27FC236}">
-                <a16:creationId xmlns:a16="http://schemas.microsoft.com/office/drawing/2014/main" id="{2BCE5FA6-AFED-4247-9BD4-42804380053D}"/>
-              </a:ext>
-            </a:extLst>
-          </p:cNvPr>
-          <p:cNvSpPr>
-            <a:spLocks noGrp="1"/>
-          </p:cNvSpPr>
-          <p:nvPr>
-            <p:ph type="body" sz="quarter" idx="16" hasCustomPrompt="1"/>
-          </p:nvPr>
-        </p:nvSpPr>
-        <p:spPr>
-          <a:xfrm>
-            <a:off x="356805" y="5712525"/>
-            <a:ext cx="11470513" cy="345763"/>
-          </a:xfrm>
-          <a:prstGeom prst="rect">
-            <a:avLst/>
-          </a:prstGeom>
-        </p:spPr>
-        <p:txBody>
-          <a:bodyPr>
-            <a:noAutofit/>
-          </a:bodyPr>
-          <a:lstStyle>
-            <a:lvl1pPr algn="l" rtl="0">
-              <a:defRPr lang="en-IL" sz="1800" b="0" baseline="0" dirty="0">
-                <a:solidFill>
-                  <a:srgbClr val="0066FF"/>
-                </a:solidFill>
-                <a:latin typeface="Calibri" panose="020F0502020204030204" pitchFamily="34" charset="0"/>
-                <a:ea typeface="+mj-ea"/>
-                <a:cs typeface="Fb Albatros" panose="02020503050405020304" pitchFamily="18" charset="-79"/>
-              </a:defRPr>
-            </a:lvl1pPr>
-          </a:lstStyle>
-          <a:p>
-            <a:pPr lvl="0">
-              <a:spcBef>
-                <a:spcPct val="0"/>
-              </a:spcBef>
-              <a:buNone/>
-            </a:pPr>
-            <a:r>
-              <a:rPr lang="he-IL" dirty="0"/>
-              <a:t>לחץ כדי להוסיף תוכן</a:t>
-            </a:r>
-            <a:endParaRPr lang="en-IL" dirty="0"/>
-          </a:p>
-        </p:txBody>
-      </p:sp>
-      <p:sp>
-        <p:nvSpPr>
           <p:cNvPr id="12" name="content">
             <a:extLst>
               <a:ext uri="{FF2B5EF4-FFF2-40B4-BE49-F238E27FC236}">
@@ -1569,7 +1457,7 @@
         <p:spPr>
           <a:xfrm>
             <a:off x="346073" y="1533837"/>
-            <a:ext cx="11485183" cy="4063939"/>
+            <a:ext cx="11485183" cy="4447113"/>
           </a:xfrm>
           <a:prstGeom prst="rect">
             <a:avLst/>

</xml_diff>